<commit_message>
finished evaluation and included .env file
</commit_message>
<xml_diff>
--- a/Grafiken.pptx
+++ b/Grafiken.pptx
@@ -260,7 +260,7 @@
           <a:p>
             <a:fld id="{0F313B5F-B820-CB45-88DA-20EDD2BDF1CB}" type="datetimeFigureOut">
               <a:rPr lang="de-DE" smtClean="0"/>
-              <a:t>04.09.24</a:t>
+              <a:t>11.09.24</a:t>
             </a:fld>
             <a:endParaRPr lang="de-DE"/>
           </a:p>
@@ -458,7 +458,7 @@
           <a:p>
             <a:fld id="{0F313B5F-B820-CB45-88DA-20EDD2BDF1CB}" type="datetimeFigureOut">
               <a:rPr lang="de-DE" smtClean="0"/>
-              <a:t>04.09.24</a:t>
+              <a:t>11.09.24</a:t>
             </a:fld>
             <a:endParaRPr lang="de-DE"/>
           </a:p>
@@ -666,7 +666,7 @@
           <a:p>
             <a:fld id="{0F313B5F-B820-CB45-88DA-20EDD2BDF1CB}" type="datetimeFigureOut">
               <a:rPr lang="de-DE" smtClean="0"/>
-              <a:t>04.09.24</a:t>
+              <a:t>11.09.24</a:t>
             </a:fld>
             <a:endParaRPr lang="de-DE"/>
           </a:p>
@@ -864,7 +864,7 @@
           <a:p>
             <a:fld id="{0F313B5F-B820-CB45-88DA-20EDD2BDF1CB}" type="datetimeFigureOut">
               <a:rPr lang="de-DE" smtClean="0"/>
-              <a:t>04.09.24</a:t>
+              <a:t>11.09.24</a:t>
             </a:fld>
             <a:endParaRPr lang="de-DE"/>
           </a:p>
@@ -1139,7 +1139,7 @@
           <a:p>
             <a:fld id="{0F313B5F-B820-CB45-88DA-20EDD2BDF1CB}" type="datetimeFigureOut">
               <a:rPr lang="de-DE" smtClean="0"/>
-              <a:t>04.09.24</a:t>
+              <a:t>11.09.24</a:t>
             </a:fld>
             <a:endParaRPr lang="de-DE"/>
           </a:p>
@@ -1404,7 +1404,7 @@
           <a:p>
             <a:fld id="{0F313B5F-B820-CB45-88DA-20EDD2BDF1CB}" type="datetimeFigureOut">
               <a:rPr lang="de-DE" smtClean="0"/>
-              <a:t>04.09.24</a:t>
+              <a:t>11.09.24</a:t>
             </a:fld>
             <a:endParaRPr lang="de-DE"/>
           </a:p>
@@ -1816,7 +1816,7 @@
           <a:p>
             <a:fld id="{0F313B5F-B820-CB45-88DA-20EDD2BDF1CB}" type="datetimeFigureOut">
               <a:rPr lang="de-DE" smtClean="0"/>
-              <a:t>04.09.24</a:t>
+              <a:t>11.09.24</a:t>
             </a:fld>
             <a:endParaRPr lang="de-DE"/>
           </a:p>
@@ -1957,7 +1957,7 @@
           <a:p>
             <a:fld id="{0F313B5F-B820-CB45-88DA-20EDD2BDF1CB}" type="datetimeFigureOut">
               <a:rPr lang="de-DE" smtClean="0"/>
-              <a:t>04.09.24</a:t>
+              <a:t>11.09.24</a:t>
             </a:fld>
             <a:endParaRPr lang="de-DE"/>
           </a:p>
@@ -2070,7 +2070,7 @@
           <a:p>
             <a:fld id="{0F313B5F-B820-CB45-88DA-20EDD2BDF1CB}" type="datetimeFigureOut">
               <a:rPr lang="de-DE" smtClean="0"/>
-              <a:t>04.09.24</a:t>
+              <a:t>11.09.24</a:t>
             </a:fld>
             <a:endParaRPr lang="de-DE"/>
           </a:p>
@@ -2381,7 +2381,7 @@
           <a:p>
             <a:fld id="{0F313B5F-B820-CB45-88DA-20EDD2BDF1CB}" type="datetimeFigureOut">
               <a:rPr lang="de-DE" smtClean="0"/>
-              <a:t>04.09.24</a:t>
+              <a:t>11.09.24</a:t>
             </a:fld>
             <a:endParaRPr lang="de-DE"/>
           </a:p>
@@ -2669,7 +2669,7 @@
           <a:p>
             <a:fld id="{0F313B5F-B820-CB45-88DA-20EDD2BDF1CB}" type="datetimeFigureOut">
               <a:rPr lang="de-DE" smtClean="0"/>
-              <a:t>04.09.24</a:t>
+              <a:t>11.09.24</a:t>
             </a:fld>
             <a:endParaRPr lang="de-DE"/>
           </a:p>
@@ -2910,7 +2910,7 @@
           <a:p>
             <a:fld id="{0F313B5F-B820-CB45-88DA-20EDD2BDF1CB}" type="datetimeFigureOut">
               <a:rPr lang="de-DE" smtClean="0"/>
-              <a:t>04.09.24</a:t>
+              <a:t>11.09.24</a:t>
             </a:fld>
             <a:endParaRPr lang="de-DE"/>
           </a:p>
@@ -3481,7 +3481,7 @@
         </p:blipFill>
         <p:spPr>
           <a:xfrm>
-            <a:off x="3352470" y="4284371"/>
+            <a:off x="3352470" y="4431854"/>
             <a:ext cx="914400" cy="914400"/>
           </a:xfrm>
           <a:prstGeom prst="rect">
@@ -3645,7 +3645,7 @@
         <p:spPr>
           <a:xfrm>
             <a:off x="3002222" y="2171408"/>
-            <a:ext cx="1614896" cy="1384995"/>
+            <a:ext cx="1614896" cy="1569660"/>
           </a:xfrm>
           <a:prstGeom prst="rect">
             <a:avLst/>
@@ -3729,7 +3729,7 @@
                 </a:solidFill>
                 <a:latin typeface="Georgia" panose="02040502050405020303" pitchFamily="18" charset="0"/>
               </a:rPr>
-              <a:t> HTML-Attributes &amp; Empty HTML Tags</a:t>
+              <a:t> HTML-Attributes, Empty HTML Tags, XBLR Tags</a:t>
             </a:r>
           </a:p>
         </p:txBody>
@@ -3836,7 +3836,7 @@
         <p:spPr>
           <a:xfrm>
             <a:off x="4912984" y="2259210"/>
-            <a:ext cx="2013310" cy="1354217"/>
+            <a:ext cx="2013310" cy="1723549"/>
           </a:xfrm>
           <a:prstGeom prst="rect">
             <a:avLst/>
@@ -3920,7 +3920,7 @@
                 </a:solidFill>
                 <a:latin typeface="Georgia" panose="02040502050405020303" pitchFamily="18" charset="0"/>
               </a:rPr>
-              <a:t> Character Splitter (Chunk </a:t>
+              <a:t> Character Text Splitter </a:t>
             </a:r>
             <a:r>
               <a:rPr lang="de-DE" sz="1200" i="1" dirty="0" err="1">
@@ -3929,6 +3929,24 @@
                 </a:solidFill>
                 <a:latin typeface="Georgia" panose="02040502050405020303" pitchFamily="18" charset="0"/>
               </a:rPr>
+              <a:t>based</a:t>
+            </a:r>
+            <a:r>
+              <a:rPr lang="de-DE" sz="1200" i="1" dirty="0">
+                <a:solidFill>
+                  <a:schemeClr val="accent1"/>
+                </a:solidFill>
+                <a:latin typeface="Georgia" panose="02040502050405020303" pitchFamily="18" charset="0"/>
+              </a:rPr>
+              <a:t> on HTML (Chunk </a:t>
+            </a:r>
+            <a:r>
+              <a:rPr lang="de-DE" sz="1200" i="1" dirty="0" err="1">
+                <a:solidFill>
+                  <a:schemeClr val="accent1"/>
+                </a:solidFill>
+                <a:latin typeface="Georgia" panose="02040502050405020303" pitchFamily="18" charset="0"/>
+              </a:rPr>
               <a:t>Length</a:t>
             </a:r>
             <a:r>
@@ -3938,7 +3956,7 @@
                 </a:solidFill>
                 <a:latin typeface="Georgia" panose="02040502050405020303" pitchFamily="18" charset="0"/>
               </a:rPr>
-              <a:t> = 1,000; </a:t>
+              <a:t> = 6,000 </a:t>
             </a:r>
             <a:r>
               <a:rPr lang="de-DE" sz="1200" i="1" dirty="0" err="1">
@@ -3947,6 +3965,24 @@
                 </a:solidFill>
                 <a:latin typeface="Georgia" panose="02040502050405020303" pitchFamily="18" charset="0"/>
               </a:rPr>
+              <a:t>chars</a:t>
+            </a:r>
+            <a:r>
+              <a:rPr lang="de-DE" sz="1200" i="1" dirty="0">
+                <a:solidFill>
+                  <a:schemeClr val="accent1"/>
+                </a:solidFill>
+                <a:latin typeface="Georgia" panose="02040502050405020303" pitchFamily="18" charset="0"/>
+              </a:rPr>
+              <a:t>;  </a:t>
+            </a:r>
+            <a:r>
+              <a:rPr lang="de-DE" sz="1200" i="1" dirty="0" err="1">
+                <a:solidFill>
+                  <a:schemeClr val="accent1"/>
+                </a:solidFill>
+                <a:latin typeface="Georgia" panose="02040502050405020303" pitchFamily="18" charset="0"/>
+              </a:rPr>
               <a:t>Overlap</a:t>
             </a:r>
             <a:r>
@@ -3956,7 +3992,7 @@
                 </a:solidFill>
                 <a:latin typeface="Georgia" panose="02040502050405020303" pitchFamily="18" charset="0"/>
               </a:rPr>
-              <a:t> = 100)</a:t>
+              <a:t> = 10 %)</a:t>
             </a:r>
           </a:p>
         </p:txBody>
@@ -4867,7 +4903,7 @@
         <p:spPr>
           <a:xfrm>
             <a:off x="6811498" y="2284313"/>
-            <a:ext cx="2180990" cy="1477328"/>
+            <a:ext cx="2180990" cy="1200329"/>
           </a:xfrm>
           <a:prstGeom prst="rect">
             <a:avLst/>
@@ -4933,7 +4969,7 @@
                 </a:solidFill>
                 <a:latin typeface="Georgia" panose="02040502050405020303" pitchFamily="18" charset="0"/>
               </a:rPr>
-              <a:t>Sentence</a:t>
+              <a:t>Snowflake</a:t>
             </a:r>
             <a:r>
               <a:rPr lang="de-DE" sz="1200" i="1" dirty="0">
@@ -4942,17 +4978,8 @@
                 </a:solidFill>
                 <a:latin typeface="Georgia" panose="02040502050405020303" pitchFamily="18" charset="0"/>
               </a:rPr>
-              <a:t> Transformers - all-MiniLM-l6-v2</a:t>
-            </a:r>
-          </a:p>
-          <a:p>
-            <a:pPr algn="ctr"/>
-            <a:endParaRPr lang="de-DE" i="1" dirty="0">
-              <a:solidFill>
-                <a:schemeClr val="accent1"/>
-              </a:solidFill>
-              <a:latin typeface="Georgia" panose="02040502050405020303" pitchFamily="18" charset="0"/>
-            </a:endParaRPr>
+              <a:t> Arctic-embed-m-v1.5</a:t>
+            </a:r>
           </a:p>
         </p:txBody>
       </p:sp>
@@ -5016,7 +5043,7 @@
         </p:nvCxnSpPr>
         <p:spPr>
           <a:xfrm>
-            <a:off x="3829246" y="3613427"/>
+            <a:off x="3829246" y="3760910"/>
             <a:ext cx="0" cy="700440"/>
           </a:xfrm>
           <a:prstGeom prst="straightConnector1">
@@ -5094,7 +5121,7 @@
         </p:nvSpPr>
         <p:spPr>
           <a:xfrm>
-            <a:off x="2928697" y="5169493"/>
+            <a:off x="2928697" y="5316976"/>
             <a:ext cx="1801097" cy="1477328"/>
           </a:xfrm>
           <a:prstGeom prst="rect">
@@ -6882,7 +6909,7 @@
         </p:nvCxnSpPr>
         <p:spPr>
           <a:xfrm>
-            <a:off x="6109092" y="5441269"/>
+            <a:off x="6078612" y="5432324"/>
             <a:ext cx="0" cy="528745"/>
           </a:xfrm>
           <a:prstGeom prst="straightConnector1">
@@ -6972,7 +6999,7 @@
         </p:nvSpPr>
         <p:spPr>
           <a:xfrm>
-            <a:off x="2034679" y="4395310"/>
+            <a:off x="2034679" y="4321569"/>
             <a:ext cx="1745679" cy="369332"/>
           </a:xfrm>
           <a:prstGeom prst="rect">
@@ -7094,7 +7121,7 @@
         <p:spPr>
           <a:xfrm>
             <a:off x="2855915" y="2082459"/>
-            <a:ext cx="2236841" cy="1015663"/>
+            <a:ext cx="2236841" cy="830997"/>
           </a:xfrm>
           <a:prstGeom prst="rect">
             <a:avLst/>
@@ -7196,7 +7223,7 @@
                 </a:solidFill>
                 <a:latin typeface="Georgia" panose="02040502050405020303" pitchFamily="18" charset="0"/>
               </a:rPr>
-              <a:t>Sentence</a:t>
+              <a:t>Snowflake</a:t>
             </a:r>
             <a:r>
               <a:rPr lang="de-DE" sz="1200" i="1" dirty="0">
@@ -7205,7 +7232,7 @@
                 </a:solidFill>
                 <a:latin typeface="Georgia" panose="02040502050405020303" pitchFamily="18" charset="0"/>
               </a:rPr>
-              <a:t> Transformers - all-MiniLM-l6-v2</a:t>
+              <a:t> Arctic-embed-m-v1.5</a:t>
             </a:r>
           </a:p>
           <a:p>
@@ -7330,6 +7357,1715 @@
           <a:p>
             <a:pPr algn="ctr"/>
             <a:endParaRPr lang="de-DE" sz="1200" i="1" dirty="0">
+              <a:solidFill>
+                <a:schemeClr val="accent6"/>
+              </a:solidFill>
+              <a:latin typeface="Georgia" panose="02040502050405020303" pitchFamily="18" charset="0"/>
+            </a:endParaRPr>
+          </a:p>
+        </p:txBody>
+      </p:sp>
+      <p:cxnSp>
+        <p:nvCxnSpPr>
+          <p:cNvPr id="2" name="Gerade Verbindung mit Pfeil 1">
+            <a:extLst>
+              <a:ext uri="{FF2B5EF4-FFF2-40B4-BE49-F238E27FC236}">
+                <a16:creationId xmlns:a16="http://schemas.microsoft.com/office/drawing/2014/main" id="{EEDB2CC0-0F07-7587-072E-C27AA6E56E31}"/>
+              </a:ext>
+            </a:extLst>
+          </p:cNvPr>
+          <p:cNvCxnSpPr>
+            <a:cxnSpLocks/>
+          </p:cNvCxnSpPr>
+          <p:nvPr/>
+        </p:nvCxnSpPr>
+        <p:spPr>
+          <a:xfrm>
+            <a:off x="7320378" y="6289574"/>
+            <a:ext cx="769368" cy="0"/>
+          </a:xfrm>
+          <a:prstGeom prst="straightConnector1">
+            <a:avLst/>
+          </a:prstGeom>
+          <a:ln w="88900">
+            <a:solidFill>
+              <a:srgbClr val="7030A0"/>
+            </a:solidFill>
+            <a:tailEnd type="triangle"/>
+          </a:ln>
+        </p:spPr>
+        <p:style>
+          <a:lnRef idx="1">
+            <a:schemeClr val="accent1"/>
+          </a:lnRef>
+          <a:fillRef idx="0">
+            <a:schemeClr val="accent1"/>
+          </a:fillRef>
+          <a:effectRef idx="0">
+            <a:schemeClr val="accent1"/>
+          </a:effectRef>
+          <a:fontRef idx="minor">
+            <a:schemeClr val="tx1"/>
+          </a:fontRef>
+        </p:style>
+      </p:cxnSp>
+      <p:pic>
+        <p:nvPicPr>
+          <p:cNvPr id="5" name="Grafik 4" descr="Präsentation mit Checkliste mit einfarbiger Füllung">
+            <a:extLst>
+              <a:ext uri="{FF2B5EF4-FFF2-40B4-BE49-F238E27FC236}">
+                <a16:creationId xmlns:a16="http://schemas.microsoft.com/office/drawing/2014/main" id="{B9492547-E53C-8A74-1C98-A535371BA039}"/>
+              </a:ext>
+            </a:extLst>
+          </p:cNvPr>
+          <p:cNvPicPr>
+            <a:picLocks noChangeAspect="1"/>
+          </p:cNvPicPr>
+          <p:nvPr/>
+        </p:nvPicPr>
+        <p:blipFill>
+          <a:blip r:embed="rId14">
+            <a:extLst>
+              <a:ext uri="{96DAC541-7B7A-43D3-8B79-37D633B846F1}">
+                <asvg:svgBlip xmlns:asvg="http://schemas.microsoft.com/office/drawing/2016/SVG/main" r:embed="rId15"/>
+              </a:ext>
+            </a:extLst>
+          </a:blip>
+          <a:stretch>
+            <a:fillRect/>
+          </a:stretch>
+        </p:blipFill>
+        <p:spPr>
+          <a:xfrm>
+            <a:off x="8321070" y="5896351"/>
+            <a:ext cx="600109" cy="600109"/>
+          </a:xfrm>
+          <a:prstGeom prst="rect">
+            <a:avLst/>
+          </a:prstGeom>
+        </p:spPr>
+      </p:pic>
+      <p:sp>
+        <p:nvSpPr>
+          <p:cNvPr id="9" name="Textfeld 8">
+            <a:extLst>
+              <a:ext uri="{FF2B5EF4-FFF2-40B4-BE49-F238E27FC236}">
+                <a16:creationId xmlns:a16="http://schemas.microsoft.com/office/drawing/2014/main" id="{C41DB9C8-FF2F-F441-972C-00250AC46A42}"/>
+              </a:ext>
+            </a:extLst>
+          </p:cNvPr>
+          <p:cNvSpPr txBox="1"/>
+          <p:nvPr/>
+        </p:nvSpPr>
+        <p:spPr>
+          <a:xfrm>
+            <a:off x="8873919" y="5902559"/>
+            <a:ext cx="1801097" cy="369332"/>
+          </a:xfrm>
+          <a:prstGeom prst="rect">
+            <a:avLst/>
+          </a:prstGeom>
+          <a:noFill/>
+        </p:spPr>
+        <p:txBody>
+          <a:bodyPr wrap="square" rtlCol="0">
+            <a:spAutoFit/>
+          </a:bodyPr>
+          <a:lstStyle/>
+          <a:p>
+            <a:pPr algn="ctr"/>
+            <a:r>
+              <a:rPr lang="de-DE" dirty="0">
+                <a:solidFill>
+                  <a:srgbClr val="7030A0"/>
+                </a:solidFill>
+                <a:latin typeface="Georgia" panose="02040502050405020303" pitchFamily="18" charset="0"/>
+              </a:rPr>
+              <a:t>Evaluation</a:t>
+            </a:r>
+          </a:p>
+        </p:txBody>
+      </p:sp>
+      <p:sp>
+        <p:nvSpPr>
+          <p:cNvPr id="10" name="Textfeld 9">
+            <a:extLst>
+              <a:ext uri="{FF2B5EF4-FFF2-40B4-BE49-F238E27FC236}">
+                <a16:creationId xmlns:a16="http://schemas.microsoft.com/office/drawing/2014/main" id="{AA96DCCD-6AB8-22DD-0F01-F5FC5144E24E}"/>
+              </a:ext>
+            </a:extLst>
+          </p:cNvPr>
+          <p:cNvSpPr txBox="1"/>
+          <p:nvPr/>
+        </p:nvSpPr>
+        <p:spPr>
+          <a:xfrm>
+            <a:off x="8642595" y="6190626"/>
+            <a:ext cx="2236841" cy="461665"/>
+          </a:xfrm>
+          <a:prstGeom prst="rect">
+            <a:avLst/>
+          </a:prstGeom>
+          <a:noFill/>
+        </p:spPr>
+        <p:txBody>
+          <a:bodyPr wrap="square" rtlCol="0">
+            <a:spAutoFit/>
+          </a:bodyPr>
+          <a:lstStyle/>
+          <a:p>
+            <a:pPr algn="ctr"/>
+            <a:r>
+              <a:rPr lang="de-DE" sz="1200" i="1" dirty="0">
+                <a:solidFill>
+                  <a:srgbClr val="7030A0"/>
+                </a:solidFill>
+                <a:latin typeface="Georgia" panose="02040502050405020303" pitchFamily="18" charset="0"/>
+              </a:rPr>
+              <a:t>-&gt; </a:t>
+            </a:r>
+            <a:r>
+              <a:rPr lang="de-DE" sz="1200" i="1" dirty="0" err="1">
+                <a:solidFill>
+                  <a:srgbClr val="7030A0"/>
+                </a:solidFill>
+                <a:latin typeface="Georgia" panose="02040502050405020303" pitchFamily="18" charset="0"/>
+              </a:rPr>
+              <a:t>Accuracy</a:t>
+            </a:r>
+            <a:r>
+              <a:rPr lang="de-DE" sz="1200" i="1" dirty="0">
+                <a:solidFill>
+                  <a:srgbClr val="7030A0"/>
+                </a:solidFill>
+                <a:latin typeface="Georgia" panose="02040502050405020303" pitchFamily="18" charset="0"/>
+              </a:rPr>
+              <a:t>, F1 Score</a:t>
+            </a:r>
+          </a:p>
+          <a:p>
+            <a:pPr algn="ctr"/>
+            <a:endParaRPr lang="de-DE" sz="1200" i="1" dirty="0">
+              <a:solidFill>
+                <a:srgbClr val="7030A0"/>
+              </a:solidFill>
+              <a:latin typeface="Georgia" panose="02040502050405020303" pitchFamily="18" charset="0"/>
+            </a:endParaRPr>
+          </a:p>
+        </p:txBody>
+      </p:sp>
+      <p:sp>
+        <p:nvSpPr>
+          <p:cNvPr id="11" name="Textfeld 10">
+            <a:extLst>
+              <a:ext uri="{FF2B5EF4-FFF2-40B4-BE49-F238E27FC236}">
+                <a16:creationId xmlns:a16="http://schemas.microsoft.com/office/drawing/2014/main" id="{A5394BC5-0EBE-CB4E-8309-339550766C06}"/>
+              </a:ext>
+            </a:extLst>
+          </p:cNvPr>
+          <p:cNvSpPr txBox="1"/>
+          <p:nvPr/>
+        </p:nvSpPr>
+        <p:spPr>
+          <a:xfrm>
+            <a:off x="1376488" y="4716037"/>
+            <a:ext cx="3257889" cy="2062103"/>
+          </a:xfrm>
+          <a:prstGeom prst="rect">
+            <a:avLst/>
+          </a:prstGeom>
+          <a:noFill/>
+          <a:ln w="25400">
+            <a:solidFill>
+              <a:srgbClr val="DD922F"/>
+            </a:solidFill>
+          </a:ln>
+        </p:spPr>
+        <p:txBody>
+          <a:bodyPr wrap="square" rtlCol="0">
+            <a:spAutoFit/>
+          </a:bodyPr>
+          <a:lstStyle/>
+          <a:p>
+            <a:r>
+              <a:rPr lang="de-DE" sz="800" i="1" dirty="0" err="1">
+                <a:solidFill>
+                  <a:srgbClr val="002060"/>
+                </a:solidFill>
+                <a:latin typeface="Georgia" panose="02040502050405020303" pitchFamily="18" charset="0"/>
+              </a:rPr>
+              <a:t>You</a:t>
+            </a:r>
+            <a:r>
+              <a:rPr lang="de-DE" sz="800" i="1" dirty="0">
+                <a:solidFill>
+                  <a:srgbClr val="002060"/>
+                </a:solidFill>
+                <a:latin typeface="Georgia" panose="02040502050405020303" pitchFamily="18" charset="0"/>
+              </a:rPr>
+              <a:t> </a:t>
+            </a:r>
+            <a:r>
+              <a:rPr lang="de-DE" sz="800" i="1" dirty="0" err="1">
+                <a:solidFill>
+                  <a:srgbClr val="002060"/>
+                </a:solidFill>
+                <a:latin typeface="Georgia" panose="02040502050405020303" pitchFamily="18" charset="0"/>
+              </a:rPr>
+              <a:t>are</a:t>
+            </a:r>
+            <a:r>
+              <a:rPr lang="de-DE" sz="800" i="1" dirty="0">
+                <a:solidFill>
+                  <a:srgbClr val="002060"/>
+                </a:solidFill>
+                <a:latin typeface="Georgia" panose="02040502050405020303" pitchFamily="18" charset="0"/>
+              </a:rPr>
+              <a:t> </a:t>
+            </a:r>
+            <a:r>
+              <a:rPr lang="de-DE" sz="800" i="1" dirty="0" err="1">
+                <a:solidFill>
+                  <a:srgbClr val="002060"/>
+                </a:solidFill>
+                <a:latin typeface="Georgia" panose="02040502050405020303" pitchFamily="18" charset="0"/>
+              </a:rPr>
+              <a:t>tasked</a:t>
+            </a:r>
+            <a:r>
+              <a:rPr lang="de-DE" sz="800" i="1" dirty="0">
+                <a:solidFill>
+                  <a:srgbClr val="002060"/>
+                </a:solidFill>
+                <a:latin typeface="Georgia" panose="02040502050405020303" pitchFamily="18" charset="0"/>
+              </a:rPr>
+              <a:t> </a:t>
+            </a:r>
+            <a:r>
+              <a:rPr lang="de-DE" sz="800" i="1" dirty="0" err="1">
+                <a:solidFill>
+                  <a:srgbClr val="002060"/>
+                </a:solidFill>
+                <a:latin typeface="Georgia" panose="02040502050405020303" pitchFamily="18" charset="0"/>
+              </a:rPr>
+              <a:t>with</a:t>
+            </a:r>
+            <a:r>
+              <a:rPr lang="de-DE" sz="800" i="1" dirty="0">
+                <a:solidFill>
+                  <a:srgbClr val="002060"/>
+                </a:solidFill>
+                <a:latin typeface="Georgia" panose="02040502050405020303" pitchFamily="18" charset="0"/>
+              </a:rPr>
+              <a:t> </a:t>
+            </a:r>
+            <a:r>
+              <a:rPr lang="de-DE" sz="800" i="1" dirty="0" err="1">
+                <a:solidFill>
+                  <a:srgbClr val="002060"/>
+                </a:solidFill>
+                <a:latin typeface="Georgia" panose="02040502050405020303" pitchFamily="18" charset="0"/>
+              </a:rPr>
+              <a:t>answering</a:t>
+            </a:r>
+            <a:r>
+              <a:rPr lang="de-DE" sz="800" i="1" dirty="0">
+                <a:solidFill>
+                  <a:srgbClr val="002060"/>
+                </a:solidFill>
+                <a:latin typeface="Georgia" panose="02040502050405020303" pitchFamily="18" charset="0"/>
+              </a:rPr>
+              <a:t> </a:t>
+            </a:r>
+            <a:r>
+              <a:rPr lang="de-DE" sz="800" i="1" dirty="0" err="1">
+                <a:solidFill>
+                  <a:srgbClr val="002060"/>
+                </a:solidFill>
+                <a:latin typeface="Georgia" panose="02040502050405020303" pitchFamily="18" charset="0"/>
+              </a:rPr>
+              <a:t>questions</a:t>
+            </a:r>
+            <a:r>
+              <a:rPr lang="de-DE" sz="800" i="1" dirty="0">
+                <a:solidFill>
+                  <a:srgbClr val="002060"/>
+                </a:solidFill>
+                <a:latin typeface="Georgia" panose="02040502050405020303" pitchFamily="18" charset="0"/>
+              </a:rPr>
+              <a:t> </a:t>
+            </a:r>
+            <a:r>
+              <a:rPr lang="de-DE" sz="800" i="1" dirty="0" err="1">
+                <a:solidFill>
+                  <a:srgbClr val="002060"/>
+                </a:solidFill>
+                <a:latin typeface="Georgia" panose="02040502050405020303" pitchFamily="18" charset="0"/>
+              </a:rPr>
+              <a:t>based</a:t>
+            </a:r>
+            <a:r>
+              <a:rPr lang="de-DE" sz="800" i="1" dirty="0">
+                <a:solidFill>
+                  <a:srgbClr val="002060"/>
+                </a:solidFill>
+                <a:latin typeface="Georgia" panose="02040502050405020303" pitchFamily="18" charset="0"/>
+              </a:rPr>
+              <a:t> on </a:t>
+            </a:r>
+            <a:r>
+              <a:rPr lang="de-DE" sz="800" i="1" dirty="0" err="1">
+                <a:solidFill>
+                  <a:srgbClr val="002060"/>
+                </a:solidFill>
+                <a:latin typeface="Georgia" panose="02040502050405020303" pitchFamily="18" charset="0"/>
+              </a:rPr>
+              <a:t>specific</a:t>
+            </a:r>
+            <a:r>
+              <a:rPr lang="de-DE" sz="800" i="1" dirty="0">
+                <a:solidFill>
+                  <a:srgbClr val="002060"/>
+                </a:solidFill>
+                <a:latin typeface="Georgia" panose="02040502050405020303" pitchFamily="18" charset="0"/>
+              </a:rPr>
+              <a:t> </a:t>
+            </a:r>
+            <a:r>
+              <a:rPr lang="de-DE" sz="800" i="1" dirty="0" err="1">
+                <a:solidFill>
+                  <a:srgbClr val="002060"/>
+                </a:solidFill>
+                <a:latin typeface="Georgia" panose="02040502050405020303" pitchFamily="18" charset="0"/>
+              </a:rPr>
+              <a:t>financial</a:t>
+            </a:r>
+            <a:r>
+              <a:rPr lang="de-DE" sz="800" i="1" dirty="0">
+                <a:solidFill>
+                  <a:srgbClr val="002060"/>
+                </a:solidFill>
+                <a:latin typeface="Georgia" panose="02040502050405020303" pitchFamily="18" charset="0"/>
+              </a:rPr>
+              <a:t> </a:t>
+            </a:r>
+            <a:r>
+              <a:rPr lang="de-DE" sz="800" i="1" dirty="0" err="1">
+                <a:solidFill>
+                  <a:srgbClr val="002060"/>
+                </a:solidFill>
+                <a:latin typeface="Georgia" panose="02040502050405020303" pitchFamily="18" charset="0"/>
+              </a:rPr>
+              <a:t>documents</a:t>
+            </a:r>
+            <a:r>
+              <a:rPr lang="de-DE" sz="800" i="1" dirty="0">
+                <a:solidFill>
+                  <a:srgbClr val="002060"/>
+                </a:solidFill>
+                <a:latin typeface="Georgia" panose="02040502050405020303" pitchFamily="18" charset="0"/>
+              </a:rPr>
+              <a:t>. </a:t>
+            </a:r>
+            <a:r>
+              <a:rPr lang="de-DE" sz="800" i="1" dirty="0" err="1">
+                <a:solidFill>
+                  <a:srgbClr val="002060"/>
+                </a:solidFill>
+                <a:latin typeface="Georgia" panose="02040502050405020303" pitchFamily="18" charset="0"/>
+              </a:rPr>
+              <a:t>Your</a:t>
+            </a:r>
+            <a:r>
+              <a:rPr lang="de-DE" sz="800" i="1" dirty="0">
+                <a:solidFill>
+                  <a:srgbClr val="002060"/>
+                </a:solidFill>
+                <a:latin typeface="Georgia" panose="02040502050405020303" pitchFamily="18" charset="0"/>
+              </a:rPr>
+              <a:t> </a:t>
+            </a:r>
+            <a:r>
+              <a:rPr lang="de-DE" sz="800" i="1" dirty="0" err="1">
+                <a:solidFill>
+                  <a:srgbClr val="002060"/>
+                </a:solidFill>
+                <a:latin typeface="Georgia" panose="02040502050405020303" pitchFamily="18" charset="0"/>
+              </a:rPr>
+              <a:t>task</a:t>
+            </a:r>
+            <a:r>
+              <a:rPr lang="de-DE" sz="800" i="1" dirty="0">
+                <a:solidFill>
+                  <a:srgbClr val="002060"/>
+                </a:solidFill>
+                <a:latin typeface="Georgia" panose="02040502050405020303" pitchFamily="18" charset="0"/>
+              </a:rPr>
+              <a:t> </a:t>
+            </a:r>
+            <a:r>
+              <a:rPr lang="de-DE" sz="800" i="1" dirty="0" err="1">
+                <a:solidFill>
+                  <a:srgbClr val="002060"/>
+                </a:solidFill>
+                <a:latin typeface="Georgia" panose="02040502050405020303" pitchFamily="18" charset="0"/>
+              </a:rPr>
+              <a:t>is</a:t>
+            </a:r>
+            <a:r>
+              <a:rPr lang="de-DE" sz="800" i="1" dirty="0">
+                <a:solidFill>
+                  <a:srgbClr val="002060"/>
+                </a:solidFill>
+                <a:latin typeface="Georgia" panose="02040502050405020303" pitchFamily="18" charset="0"/>
+              </a:rPr>
+              <a:t> </a:t>
+            </a:r>
+            <a:r>
+              <a:rPr lang="de-DE" sz="800" i="1" dirty="0" err="1">
+                <a:solidFill>
+                  <a:srgbClr val="002060"/>
+                </a:solidFill>
+                <a:latin typeface="Georgia" panose="02040502050405020303" pitchFamily="18" charset="0"/>
+              </a:rPr>
+              <a:t>to</a:t>
+            </a:r>
+            <a:r>
+              <a:rPr lang="de-DE" sz="800" i="1" dirty="0">
+                <a:solidFill>
+                  <a:srgbClr val="002060"/>
+                </a:solidFill>
+                <a:latin typeface="Georgia" panose="02040502050405020303" pitchFamily="18" charset="0"/>
+              </a:rPr>
+              <a:t> </a:t>
+            </a:r>
+            <a:r>
+              <a:rPr lang="de-DE" sz="800" i="1" dirty="0" err="1">
+                <a:solidFill>
+                  <a:srgbClr val="002060"/>
+                </a:solidFill>
+                <a:latin typeface="Georgia" panose="02040502050405020303" pitchFamily="18" charset="0"/>
+              </a:rPr>
+              <a:t>give</a:t>
+            </a:r>
+            <a:r>
+              <a:rPr lang="de-DE" sz="800" i="1" dirty="0">
+                <a:solidFill>
+                  <a:srgbClr val="002060"/>
+                </a:solidFill>
+                <a:latin typeface="Georgia" panose="02040502050405020303" pitchFamily="18" charset="0"/>
+              </a:rPr>
+              <a:t> </a:t>
+            </a:r>
+            <a:r>
+              <a:rPr lang="de-DE" sz="800" i="1" dirty="0" err="1">
+                <a:solidFill>
+                  <a:srgbClr val="002060"/>
+                </a:solidFill>
+                <a:latin typeface="Georgia" panose="02040502050405020303" pitchFamily="18" charset="0"/>
+              </a:rPr>
+              <a:t>the</a:t>
+            </a:r>
+            <a:r>
+              <a:rPr lang="de-DE" sz="800" i="1" dirty="0">
+                <a:solidFill>
+                  <a:srgbClr val="002060"/>
+                </a:solidFill>
+                <a:latin typeface="Georgia" panose="02040502050405020303" pitchFamily="18" charset="0"/>
+              </a:rPr>
+              <a:t> </a:t>
+            </a:r>
+            <a:r>
+              <a:rPr lang="de-DE" sz="800" i="1" dirty="0" err="1">
+                <a:solidFill>
+                  <a:srgbClr val="002060"/>
+                </a:solidFill>
+                <a:latin typeface="Georgia" panose="02040502050405020303" pitchFamily="18" charset="0"/>
+              </a:rPr>
+              <a:t>correct</a:t>
+            </a:r>
+            <a:r>
+              <a:rPr lang="de-DE" sz="800" i="1" dirty="0">
+                <a:solidFill>
+                  <a:srgbClr val="002060"/>
+                </a:solidFill>
+                <a:latin typeface="Georgia" panose="02040502050405020303" pitchFamily="18" charset="0"/>
+              </a:rPr>
+              <a:t> </a:t>
+            </a:r>
+            <a:r>
+              <a:rPr lang="de-DE" sz="800" i="1" dirty="0" err="1">
+                <a:solidFill>
+                  <a:srgbClr val="002060"/>
+                </a:solidFill>
+                <a:latin typeface="Georgia" panose="02040502050405020303" pitchFamily="18" charset="0"/>
+              </a:rPr>
+              <a:t>answer</a:t>
+            </a:r>
+            <a:r>
+              <a:rPr lang="de-DE" sz="800" i="1" dirty="0">
+                <a:solidFill>
+                  <a:srgbClr val="002060"/>
+                </a:solidFill>
+                <a:latin typeface="Georgia" panose="02040502050405020303" pitchFamily="18" charset="0"/>
+              </a:rPr>
+              <a:t> </a:t>
+            </a:r>
+            <a:r>
+              <a:rPr lang="de-DE" sz="800" i="1" dirty="0" err="1">
+                <a:solidFill>
+                  <a:srgbClr val="002060"/>
+                </a:solidFill>
+                <a:latin typeface="Georgia" panose="02040502050405020303" pitchFamily="18" charset="0"/>
+              </a:rPr>
+              <a:t>based</a:t>
+            </a:r>
+            <a:r>
+              <a:rPr lang="de-DE" sz="800" i="1" dirty="0">
+                <a:solidFill>
+                  <a:srgbClr val="002060"/>
+                </a:solidFill>
+                <a:latin typeface="Georgia" panose="02040502050405020303" pitchFamily="18" charset="0"/>
+              </a:rPr>
+              <a:t> on </a:t>
+            </a:r>
+            <a:r>
+              <a:rPr lang="de-DE" sz="800" i="1" dirty="0" err="1">
+                <a:solidFill>
+                  <a:srgbClr val="002060"/>
+                </a:solidFill>
+                <a:latin typeface="Georgia" panose="02040502050405020303" pitchFamily="18" charset="0"/>
+              </a:rPr>
+              <a:t>the</a:t>
+            </a:r>
+            <a:r>
+              <a:rPr lang="de-DE" sz="800" i="1" dirty="0">
+                <a:solidFill>
+                  <a:srgbClr val="002060"/>
+                </a:solidFill>
+                <a:latin typeface="Georgia" panose="02040502050405020303" pitchFamily="18" charset="0"/>
+              </a:rPr>
+              <a:t> </a:t>
+            </a:r>
+            <a:r>
+              <a:rPr lang="de-DE" sz="800" i="1" dirty="0" err="1">
+                <a:solidFill>
+                  <a:srgbClr val="002060"/>
+                </a:solidFill>
+                <a:latin typeface="Georgia" panose="02040502050405020303" pitchFamily="18" charset="0"/>
+              </a:rPr>
+              <a:t>given</a:t>
+            </a:r>
+            <a:r>
+              <a:rPr lang="de-DE" sz="800" i="1" dirty="0">
+                <a:solidFill>
+                  <a:srgbClr val="002060"/>
+                </a:solidFill>
+                <a:latin typeface="Georgia" panose="02040502050405020303" pitchFamily="18" charset="0"/>
+              </a:rPr>
+              <a:t> </a:t>
+            </a:r>
+            <a:r>
+              <a:rPr lang="de-DE" sz="800" i="1" dirty="0" err="1">
+                <a:solidFill>
+                  <a:srgbClr val="002060"/>
+                </a:solidFill>
+                <a:latin typeface="Georgia" panose="02040502050405020303" pitchFamily="18" charset="0"/>
+              </a:rPr>
+              <a:t>context</a:t>
+            </a:r>
+            <a:r>
+              <a:rPr lang="de-DE" sz="800" i="1" dirty="0">
+                <a:solidFill>
+                  <a:srgbClr val="002060"/>
+                </a:solidFill>
+                <a:latin typeface="Georgia" panose="02040502050405020303" pitchFamily="18" charset="0"/>
+              </a:rPr>
+              <a:t>. </a:t>
+            </a:r>
+            <a:r>
+              <a:rPr lang="de-DE" sz="800" i="1" dirty="0" err="1">
+                <a:solidFill>
+                  <a:srgbClr val="002060"/>
+                </a:solidFill>
+                <a:latin typeface="Georgia" panose="02040502050405020303" pitchFamily="18" charset="0"/>
+              </a:rPr>
+              <a:t>Respond</a:t>
+            </a:r>
+            <a:r>
+              <a:rPr lang="de-DE" sz="800" i="1" dirty="0">
+                <a:solidFill>
+                  <a:srgbClr val="002060"/>
+                </a:solidFill>
+                <a:latin typeface="Georgia" panose="02040502050405020303" pitchFamily="18" charset="0"/>
+              </a:rPr>
+              <a:t> </a:t>
+            </a:r>
+            <a:r>
+              <a:rPr lang="de-DE" sz="800" i="1" dirty="0" err="1">
+                <a:solidFill>
+                  <a:srgbClr val="002060"/>
+                </a:solidFill>
+                <a:latin typeface="Georgia" panose="02040502050405020303" pitchFamily="18" charset="0"/>
+              </a:rPr>
+              <a:t>with</a:t>
+            </a:r>
+            <a:r>
+              <a:rPr lang="de-DE" sz="800" i="1" dirty="0">
+                <a:solidFill>
+                  <a:srgbClr val="002060"/>
+                </a:solidFill>
+                <a:latin typeface="Georgia" panose="02040502050405020303" pitchFamily="18" charset="0"/>
+              </a:rPr>
+              <a:t> </a:t>
+            </a:r>
+            <a:r>
+              <a:rPr lang="de-DE" sz="800" i="1" dirty="0" err="1">
+                <a:solidFill>
+                  <a:srgbClr val="002060"/>
+                </a:solidFill>
+                <a:latin typeface="Georgia" panose="02040502050405020303" pitchFamily="18" charset="0"/>
+              </a:rPr>
+              <a:t>only</a:t>
+            </a:r>
+            <a:r>
+              <a:rPr lang="de-DE" sz="800" i="1" dirty="0">
+                <a:solidFill>
+                  <a:srgbClr val="002060"/>
+                </a:solidFill>
+                <a:latin typeface="Georgia" panose="02040502050405020303" pitchFamily="18" charset="0"/>
+              </a:rPr>
+              <a:t> </a:t>
+            </a:r>
+            <a:r>
+              <a:rPr lang="de-DE" sz="800" i="1" dirty="0" err="1">
+                <a:solidFill>
+                  <a:srgbClr val="002060"/>
+                </a:solidFill>
+                <a:latin typeface="Georgia" panose="02040502050405020303" pitchFamily="18" charset="0"/>
+              </a:rPr>
+              <a:t>the</a:t>
+            </a:r>
+            <a:r>
+              <a:rPr lang="de-DE" sz="800" i="1" dirty="0">
+                <a:solidFill>
+                  <a:srgbClr val="002060"/>
+                </a:solidFill>
+                <a:latin typeface="Georgia" panose="02040502050405020303" pitchFamily="18" charset="0"/>
+              </a:rPr>
+              <a:t> </a:t>
+            </a:r>
+            <a:r>
+              <a:rPr lang="de-DE" sz="800" i="1" dirty="0" err="1">
+                <a:solidFill>
+                  <a:srgbClr val="002060"/>
+                </a:solidFill>
+                <a:latin typeface="Georgia" panose="02040502050405020303" pitchFamily="18" charset="0"/>
+              </a:rPr>
+              <a:t>answer</a:t>
+            </a:r>
+            <a:r>
+              <a:rPr lang="de-DE" sz="800" i="1" dirty="0">
+                <a:solidFill>
+                  <a:srgbClr val="002060"/>
+                </a:solidFill>
+                <a:latin typeface="Georgia" panose="02040502050405020303" pitchFamily="18" charset="0"/>
+              </a:rPr>
+              <a:t>. Do not </a:t>
+            </a:r>
+            <a:r>
+              <a:rPr lang="de-DE" sz="800" i="1" dirty="0" err="1">
+                <a:solidFill>
+                  <a:srgbClr val="002060"/>
+                </a:solidFill>
+                <a:latin typeface="Georgia" panose="02040502050405020303" pitchFamily="18" charset="0"/>
+              </a:rPr>
+              <a:t>include</a:t>
+            </a:r>
+            <a:r>
+              <a:rPr lang="de-DE" sz="800" i="1" dirty="0">
+                <a:solidFill>
+                  <a:srgbClr val="002060"/>
+                </a:solidFill>
+                <a:latin typeface="Georgia" panose="02040502050405020303" pitchFamily="18" charset="0"/>
+              </a:rPr>
+              <a:t> </a:t>
+            </a:r>
+            <a:r>
+              <a:rPr lang="de-DE" sz="800" i="1" dirty="0" err="1">
+                <a:solidFill>
+                  <a:srgbClr val="002060"/>
+                </a:solidFill>
+                <a:latin typeface="Georgia" panose="02040502050405020303" pitchFamily="18" charset="0"/>
+              </a:rPr>
+              <a:t>words</a:t>
+            </a:r>
+            <a:r>
+              <a:rPr lang="de-DE" sz="800" i="1" dirty="0">
+                <a:solidFill>
+                  <a:srgbClr val="002060"/>
+                </a:solidFill>
+                <a:latin typeface="Georgia" panose="02040502050405020303" pitchFamily="18" charset="0"/>
+              </a:rPr>
+              <a:t> like "</a:t>
+            </a:r>
+            <a:r>
+              <a:rPr lang="de-DE" sz="800" i="1" dirty="0" err="1">
+                <a:solidFill>
+                  <a:srgbClr val="002060"/>
+                </a:solidFill>
+                <a:latin typeface="Georgia" panose="02040502050405020303" pitchFamily="18" charset="0"/>
+              </a:rPr>
+              <a:t>Answer</a:t>
+            </a:r>
+            <a:r>
+              <a:rPr lang="de-DE" sz="800" i="1" dirty="0">
+                <a:solidFill>
+                  <a:srgbClr val="002060"/>
+                </a:solidFill>
+                <a:latin typeface="Georgia" panose="02040502050405020303" pitchFamily="18" charset="0"/>
+              </a:rPr>
+              <a:t>" </a:t>
+            </a:r>
+            <a:r>
+              <a:rPr lang="de-DE" sz="800" i="1" dirty="0" err="1">
+                <a:solidFill>
+                  <a:srgbClr val="002060"/>
+                </a:solidFill>
+                <a:latin typeface="Georgia" panose="02040502050405020303" pitchFamily="18" charset="0"/>
+              </a:rPr>
+              <a:t>or</a:t>
+            </a:r>
+            <a:r>
+              <a:rPr lang="de-DE" sz="800" i="1" dirty="0">
+                <a:solidFill>
+                  <a:srgbClr val="002060"/>
+                </a:solidFill>
+                <a:latin typeface="Georgia" panose="02040502050405020303" pitchFamily="18" charset="0"/>
+              </a:rPr>
+              <a:t> "Response." </a:t>
+            </a:r>
+            <a:r>
+              <a:rPr lang="de-DE" sz="800" i="1" dirty="0" err="1">
+                <a:solidFill>
+                  <a:srgbClr val="002060"/>
+                </a:solidFill>
+                <a:latin typeface="Georgia" panose="02040502050405020303" pitchFamily="18" charset="0"/>
+              </a:rPr>
+              <a:t>Provide</a:t>
+            </a:r>
+            <a:r>
+              <a:rPr lang="de-DE" sz="800" i="1" dirty="0">
+                <a:solidFill>
+                  <a:srgbClr val="002060"/>
+                </a:solidFill>
+                <a:latin typeface="Georgia" panose="02040502050405020303" pitchFamily="18" charset="0"/>
+              </a:rPr>
+              <a:t> </a:t>
+            </a:r>
+            <a:r>
+              <a:rPr lang="de-DE" sz="800" i="1" dirty="0" err="1">
+                <a:solidFill>
+                  <a:srgbClr val="002060"/>
+                </a:solidFill>
+                <a:latin typeface="Georgia" panose="02040502050405020303" pitchFamily="18" charset="0"/>
+              </a:rPr>
+              <a:t>the</a:t>
+            </a:r>
+            <a:r>
+              <a:rPr lang="de-DE" sz="800" i="1" dirty="0">
+                <a:solidFill>
+                  <a:srgbClr val="002060"/>
+                </a:solidFill>
+                <a:latin typeface="Georgia" panose="02040502050405020303" pitchFamily="18" charset="0"/>
+              </a:rPr>
+              <a:t> </a:t>
+            </a:r>
+            <a:r>
+              <a:rPr lang="de-DE" sz="800" i="1" dirty="0" err="1">
+                <a:solidFill>
+                  <a:srgbClr val="002060"/>
+                </a:solidFill>
+                <a:latin typeface="Georgia" panose="02040502050405020303" pitchFamily="18" charset="0"/>
+              </a:rPr>
+              <a:t>answer</a:t>
+            </a:r>
+            <a:r>
+              <a:rPr lang="de-DE" sz="800" i="1" dirty="0">
+                <a:solidFill>
+                  <a:srgbClr val="002060"/>
+                </a:solidFill>
+                <a:latin typeface="Georgia" panose="02040502050405020303" pitchFamily="18" charset="0"/>
+              </a:rPr>
+              <a:t> </a:t>
+            </a:r>
+            <a:r>
+              <a:rPr lang="de-DE" sz="800" i="1" dirty="0" err="1">
+                <a:solidFill>
+                  <a:srgbClr val="002060"/>
+                </a:solidFill>
+                <a:latin typeface="Georgia" panose="02040502050405020303" pitchFamily="18" charset="0"/>
+              </a:rPr>
+              <a:t>as</a:t>
+            </a:r>
+            <a:r>
+              <a:rPr lang="de-DE" sz="800" i="1" dirty="0">
+                <a:solidFill>
+                  <a:srgbClr val="002060"/>
+                </a:solidFill>
+                <a:latin typeface="Georgia" panose="02040502050405020303" pitchFamily="18" charset="0"/>
+              </a:rPr>
+              <a:t> </a:t>
+            </a:r>
+            <a:r>
+              <a:rPr lang="de-DE" sz="800" i="1" dirty="0" err="1">
+                <a:solidFill>
+                  <a:srgbClr val="002060"/>
+                </a:solidFill>
+                <a:latin typeface="Georgia" panose="02040502050405020303" pitchFamily="18" charset="0"/>
+              </a:rPr>
+              <a:t>either</a:t>
+            </a:r>
+            <a:r>
+              <a:rPr lang="de-DE" sz="800" i="1" dirty="0">
+                <a:solidFill>
+                  <a:srgbClr val="002060"/>
+                </a:solidFill>
+                <a:latin typeface="Georgia" panose="02040502050405020303" pitchFamily="18" charset="0"/>
+              </a:rPr>
+              <a:t>:</a:t>
+            </a:r>
+          </a:p>
+          <a:p>
+            <a:r>
+              <a:rPr lang="de-DE" sz="800" i="1" dirty="0">
+                <a:solidFill>
+                  <a:srgbClr val="002060"/>
+                </a:solidFill>
+                <a:latin typeface="Georgia" panose="02040502050405020303" pitchFamily="18" charset="0"/>
+              </a:rPr>
+              <a:t>- A </a:t>
+            </a:r>
+            <a:r>
+              <a:rPr lang="de-DE" sz="800" i="1" dirty="0" err="1">
+                <a:solidFill>
+                  <a:srgbClr val="002060"/>
+                </a:solidFill>
+                <a:latin typeface="Georgia" panose="02040502050405020303" pitchFamily="18" charset="0"/>
+              </a:rPr>
+              <a:t>number</a:t>
+            </a:r>
+            <a:r>
+              <a:rPr lang="de-DE" sz="800" i="1" dirty="0">
+                <a:solidFill>
+                  <a:srgbClr val="002060"/>
+                </a:solidFill>
+                <a:latin typeface="Georgia" panose="02040502050405020303" pitchFamily="18" charset="0"/>
+              </a:rPr>
+              <a:t> </a:t>
+            </a:r>
+            <a:r>
+              <a:rPr lang="de-DE" sz="800" i="1" dirty="0" err="1">
+                <a:solidFill>
+                  <a:srgbClr val="002060"/>
+                </a:solidFill>
+                <a:latin typeface="Georgia" panose="02040502050405020303" pitchFamily="18" charset="0"/>
+              </a:rPr>
+              <a:t>for</a:t>
+            </a:r>
+            <a:r>
+              <a:rPr lang="de-DE" sz="800" i="1" dirty="0">
+                <a:solidFill>
+                  <a:srgbClr val="002060"/>
+                </a:solidFill>
+                <a:latin typeface="Georgia" panose="02040502050405020303" pitchFamily="18" charset="0"/>
+              </a:rPr>
+              <a:t> </a:t>
+            </a:r>
+            <a:r>
+              <a:rPr lang="de-DE" sz="800" i="1" dirty="0" err="1">
+                <a:solidFill>
+                  <a:srgbClr val="002060"/>
+                </a:solidFill>
+                <a:latin typeface="Georgia" panose="02040502050405020303" pitchFamily="18" charset="0"/>
+              </a:rPr>
+              <a:t>questions</a:t>
+            </a:r>
+            <a:r>
+              <a:rPr lang="de-DE" sz="800" i="1" dirty="0">
+                <a:solidFill>
+                  <a:srgbClr val="002060"/>
+                </a:solidFill>
+                <a:latin typeface="Georgia" panose="02040502050405020303" pitchFamily="18" charset="0"/>
+              </a:rPr>
+              <a:t> </a:t>
+            </a:r>
+            <a:r>
+              <a:rPr lang="de-DE" sz="800" i="1" dirty="0" err="1">
+                <a:solidFill>
+                  <a:srgbClr val="002060"/>
+                </a:solidFill>
+                <a:latin typeface="Georgia" panose="02040502050405020303" pitchFamily="18" charset="0"/>
+              </a:rPr>
+              <a:t>about</a:t>
+            </a:r>
+            <a:r>
+              <a:rPr lang="de-DE" sz="800" i="1" dirty="0">
+                <a:solidFill>
+                  <a:srgbClr val="002060"/>
+                </a:solidFill>
+                <a:latin typeface="Georgia" panose="02040502050405020303" pitchFamily="18" charset="0"/>
+              </a:rPr>
+              <a:t> </a:t>
+            </a:r>
+            <a:r>
+              <a:rPr lang="de-DE" sz="800" i="1" dirty="0" err="1">
+                <a:solidFill>
+                  <a:srgbClr val="002060"/>
+                </a:solidFill>
+                <a:latin typeface="Georgia" panose="02040502050405020303" pitchFamily="18" charset="0"/>
+              </a:rPr>
+              <a:t>revenue</a:t>
+            </a:r>
+            <a:r>
+              <a:rPr lang="de-DE" sz="800" i="1" dirty="0">
+                <a:solidFill>
+                  <a:srgbClr val="002060"/>
+                </a:solidFill>
+                <a:latin typeface="Georgia" panose="02040502050405020303" pitchFamily="18" charset="0"/>
+              </a:rPr>
+              <a:t>, </a:t>
+            </a:r>
+            <a:r>
+              <a:rPr lang="de-DE" sz="800" i="1" dirty="0" err="1">
+                <a:solidFill>
+                  <a:srgbClr val="002060"/>
+                </a:solidFill>
+                <a:latin typeface="Georgia" panose="02040502050405020303" pitchFamily="18" charset="0"/>
+              </a:rPr>
+              <a:t>profit</a:t>
+            </a:r>
+            <a:r>
+              <a:rPr lang="de-DE" sz="800" i="1" dirty="0">
+                <a:solidFill>
+                  <a:srgbClr val="002060"/>
+                </a:solidFill>
+                <a:latin typeface="Georgia" panose="02040502050405020303" pitchFamily="18" charset="0"/>
+              </a:rPr>
+              <a:t>, </a:t>
+            </a:r>
+            <a:r>
+              <a:rPr lang="de-DE" sz="800" i="1" dirty="0" err="1">
+                <a:solidFill>
+                  <a:srgbClr val="002060"/>
+                </a:solidFill>
+                <a:latin typeface="Georgia" panose="02040502050405020303" pitchFamily="18" charset="0"/>
+              </a:rPr>
+              <a:t>or</a:t>
+            </a:r>
+            <a:r>
+              <a:rPr lang="de-DE" sz="800" i="1" dirty="0">
+                <a:solidFill>
+                  <a:srgbClr val="002060"/>
+                </a:solidFill>
+                <a:latin typeface="Georgia" panose="02040502050405020303" pitchFamily="18" charset="0"/>
+              </a:rPr>
+              <a:t> </a:t>
+            </a:r>
+            <a:r>
+              <a:rPr lang="de-DE" sz="800" i="1" dirty="0" err="1">
+                <a:solidFill>
+                  <a:srgbClr val="002060"/>
+                </a:solidFill>
+                <a:latin typeface="Georgia" panose="02040502050405020303" pitchFamily="18" charset="0"/>
+              </a:rPr>
+              <a:t>quantities</a:t>
+            </a:r>
+            <a:r>
+              <a:rPr lang="de-DE" sz="800" i="1" dirty="0">
+                <a:solidFill>
+                  <a:srgbClr val="002060"/>
+                </a:solidFill>
+                <a:latin typeface="Georgia" panose="02040502050405020303" pitchFamily="18" charset="0"/>
+              </a:rPr>
+              <a:t>.</a:t>
+            </a:r>
+          </a:p>
+          <a:p>
+            <a:r>
+              <a:rPr lang="de-DE" sz="800" i="1" dirty="0">
+                <a:solidFill>
+                  <a:srgbClr val="002060"/>
+                </a:solidFill>
+                <a:latin typeface="Georgia" panose="02040502050405020303" pitchFamily="18" charset="0"/>
+              </a:rPr>
+              <a:t>- A </a:t>
+            </a:r>
+            <a:r>
+              <a:rPr lang="de-DE" sz="800" i="1" dirty="0" err="1">
+                <a:solidFill>
+                  <a:srgbClr val="002060"/>
+                </a:solidFill>
+                <a:latin typeface="Georgia" panose="02040502050405020303" pitchFamily="18" charset="0"/>
+              </a:rPr>
+              <a:t>word</a:t>
+            </a:r>
+            <a:r>
+              <a:rPr lang="de-DE" sz="800" i="1" dirty="0">
+                <a:solidFill>
+                  <a:srgbClr val="002060"/>
+                </a:solidFill>
+                <a:latin typeface="Georgia" panose="02040502050405020303" pitchFamily="18" charset="0"/>
+              </a:rPr>
+              <a:t> </a:t>
+            </a:r>
+            <a:r>
+              <a:rPr lang="de-DE" sz="800" i="1" dirty="0" err="1">
+                <a:solidFill>
+                  <a:srgbClr val="002060"/>
+                </a:solidFill>
+                <a:latin typeface="Georgia" panose="02040502050405020303" pitchFamily="18" charset="0"/>
+              </a:rPr>
+              <a:t>or</a:t>
+            </a:r>
+            <a:r>
+              <a:rPr lang="de-DE" sz="800" i="1" dirty="0">
+                <a:solidFill>
+                  <a:srgbClr val="002060"/>
+                </a:solidFill>
+                <a:latin typeface="Georgia" panose="02040502050405020303" pitchFamily="18" charset="0"/>
+              </a:rPr>
+              <a:t> </a:t>
+            </a:r>
+            <a:r>
+              <a:rPr lang="de-DE" sz="800" i="1" dirty="0" err="1">
+                <a:solidFill>
+                  <a:srgbClr val="002060"/>
+                </a:solidFill>
+                <a:latin typeface="Georgia" panose="02040502050405020303" pitchFamily="18" charset="0"/>
+              </a:rPr>
+              <a:t>phrase</a:t>
+            </a:r>
+            <a:r>
+              <a:rPr lang="de-DE" sz="800" i="1" dirty="0">
+                <a:solidFill>
+                  <a:srgbClr val="002060"/>
+                </a:solidFill>
+                <a:latin typeface="Georgia" panose="02040502050405020303" pitchFamily="18" charset="0"/>
+              </a:rPr>
+              <a:t> </a:t>
+            </a:r>
+            <a:r>
+              <a:rPr lang="de-DE" sz="800" i="1" dirty="0" err="1">
+                <a:solidFill>
+                  <a:srgbClr val="002060"/>
+                </a:solidFill>
+                <a:latin typeface="Georgia" panose="02040502050405020303" pitchFamily="18" charset="0"/>
+              </a:rPr>
+              <a:t>for</a:t>
+            </a:r>
+            <a:r>
+              <a:rPr lang="de-DE" sz="800" i="1" dirty="0">
+                <a:solidFill>
+                  <a:srgbClr val="002060"/>
+                </a:solidFill>
+                <a:latin typeface="Georgia" panose="02040502050405020303" pitchFamily="18" charset="0"/>
+              </a:rPr>
+              <a:t> </a:t>
+            </a:r>
+            <a:r>
+              <a:rPr lang="de-DE" sz="800" i="1" dirty="0" err="1">
+                <a:solidFill>
+                  <a:srgbClr val="002060"/>
+                </a:solidFill>
+                <a:latin typeface="Georgia" panose="02040502050405020303" pitchFamily="18" charset="0"/>
+              </a:rPr>
+              <a:t>questions</a:t>
+            </a:r>
+            <a:r>
+              <a:rPr lang="de-DE" sz="800" i="1" dirty="0">
+                <a:solidFill>
+                  <a:srgbClr val="002060"/>
+                </a:solidFill>
+                <a:latin typeface="Georgia" panose="02040502050405020303" pitchFamily="18" charset="0"/>
+              </a:rPr>
+              <a:t> </a:t>
+            </a:r>
+            <a:r>
+              <a:rPr lang="de-DE" sz="800" i="1" dirty="0" err="1">
+                <a:solidFill>
+                  <a:srgbClr val="002060"/>
+                </a:solidFill>
+                <a:latin typeface="Georgia" panose="02040502050405020303" pitchFamily="18" charset="0"/>
+              </a:rPr>
+              <a:t>about</a:t>
+            </a:r>
+            <a:r>
+              <a:rPr lang="de-DE" sz="800" i="1" dirty="0">
+                <a:solidFill>
+                  <a:srgbClr val="002060"/>
+                </a:solidFill>
+                <a:latin typeface="Georgia" panose="02040502050405020303" pitchFamily="18" charset="0"/>
+              </a:rPr>
+              <a:t> </a:t>
+            </a:r>
+            <a:r>
+              <a:rPr lang="de-DE" sz="800" i="1" dirty="0" err="1">
+                <a:solidFill>
+                  <a:srgbClr val="002060"/>
+                </a:solidFill>
+                <a:latin typeface="Georgia" panose="02040502050405020303" pitchFamily="18" charset="0"/>
+              </a:rPr>
+              <a:t>products</a:t>
+            </a:r>
+            <a:r>
+              <a:rPr lang="de-DE" sz="800" i="1" dirty="0">
+                <a:solidFill>
+                  <a:srgbClr val="002060"/>
+                </a:solidFill>
+                <a:latin typeface="Georgia" panose="02040502050405020303" pitchFamily="18" charset="0"/>
+              </a:rPr>
+              <a:t>, </a:t>
+            </a:r>
+            <a:r>
+              <a:rPr lang="de-DE" sz="800" i="1" dirty="0" err="1">
+                <a:solidFill>
+                  <a:srgbClr val="002060"/>
+                </a:solidFill>
+                <a:latin typeface="Georgia" panose="02040502050405020303" pitchFamily="18" charset="0"/>
+              </a:rPr>
+              <a:t>categories</a:t>
+            </a:r>
+            <a:r>
+              <a:rPr lang="de-DE" sz="800" i="1" dirty="0">
+                <a:solidFill>
+                  <a:srgbClr val="002060"/>
+                </a:solidFill>
+                <a:latin typeface="Georgia" panose="02040502050405020303" pitchFamily="18" charset="0"/>
+              </a:rPr>
+              <a:t>, </a:t>
+            </a:r>
+            <a:r>
+              <a:rPr lang="de-DE" sz="800" i="1" dirty="0" err="1">
+                <a:solidFill>
+                  <a:srgbClr val="002060"/>
+                </a:solidFill>
+                <a:latin typeface="Georgia" panose="02040502050405020303" pitchFamily="18" charset="0"/>
+              </a:rPr>
+              <a:t>or</a:t>
+            </a:r>
+            <a:r>
+              <a:rPr lang="de-DE" sz="800" i="1" dirty="0">
+                <a:solidFill>
+                  <a:srgbClr val="002060"/>
+                </a:solidFill>
+                <a:latin typeface="Georgia" panose="02040502050405020303" pitchFamily="18" charset="0"/>
+              </a:rPr>
+              <a:t> </a:t>
+            </a:r>
+            <a:r>
+              <a:rPr lang="de-DE" sz="800" i="1" dirty="0" err="1">
+                <a:solidFill>
+                  <a:srgbClr val="002060"/>
+                </a:solidFill>
+                <a:latin typeface="Georgia" panose="02040502050405020303" pitchFamily="18" charset="0"/>
+              </a:rPr>
+              <a:t>names</a:t>
+            </a:r>
+            <a:r>
+              <a:rPr lang="de-DE" sz="800" i="1" dirty="0">
+                <a:solidFill>
+                  <a:srgbClr val="002060"/>
+                </a:solidFill>
+                <a:latin typeface="Georgia" panose="02040502050405020303" pitchFamily="18" charset="0"/>
+              </a:rPr>
+              <a:t>.</a:t>
+            </a:r>
+          </a:p>
+          <a:p>
+            <a:r>
+              <a:rPr lang="de-DE" sz="800" i="1" dirty="0">
+                <a:solidFill>
+                  <a:srgbClr val="002060"/>
+                </a:solidFill>
+                <a:latin typeface="Georgia" panose="02040502050405020303" pitchFamily="18" charset="0"/>
+              </a:rPr>
+              <a:t>- 'None' </a:t>
+            </a:r>
+            <a:r>
+              <a:rPr lang="de-DE" sz="800" i="1" dirty="0" err="1">
+                <a:solidFill>
+                  <a:srgbClr val="002060"/>
+                </a:solidFill>
+                <a:latin typeface="Georgia" panose="02040502050405020303" pitchFamily="18" charset="0"/>
+              </a:rPr>
+              <a:t>if</a:t>
+            </a:r>
+            <a:r>
+              <a:rPr lang="de-DE" sz="800" i="1" dirty="0">
+                <a:solidFill>
+                  <a:srgbClr val="002060"/>
+                </a:solidFill>
+                <a:latin typeface="Georgia" panose="02040502050405020303" pitchFamily="18" charset="0"/>
+              </a:rPr>
+              <a:t> </a:t>
+            </a:r>
+            <a:r>
+              <a:rPr lang="de-DE" sz="800" i="1" dirty="0" err="1">
+                <a:solidFill>
+                  <a:srgbClr val="002060"/>
+                </a:solidFill>
+                <a:latin typeface="Georgia" panose="02040502050405020303" pitchFamily="18" charset="0"/>
+              </a:rPr>
+              <a:t>the</a:t>
+            </a:r>
+            <a:r>
+              <a:rPr lang="de-DE" sz="800" i="1" dirty="0">
+                <a:solidFill>
+                  <a:srgbClr val="002060"/>
+                </a:solidFill>
+                <a:latin typeface="Georgia" panose="02040502050405020303" pitchFamily="18" charset="0"/>
+              </a:rPr>
+              <a:t> </a:t>
+            </a:r>
+            <a:r>
+              <a:rPr lang="de-DE" sz="800" i="1" dirty="0" err="1">
+                <a:solidFill>
+                  <a:srgbClr val="002060"/>
+                </a:solidFill>
+                <a:latin typeface="Georgia" panose="02040502050405020303" pitchFamily="18" charset="0"/>
+              </a:rPr>
+              <a:t>context</a:t>
+            </a:r>
+            <a:r>
+              <a:rPr lang="de-DE" sz="800" i="1" dirty="0">
+                <a:solidFill>
+                  <a:srgbClr val="002060"/>
+                </a:solidFill>
+                <a:latin typeface="Georgia" panose="02040502050405020303" pitchFamily="18" charset="0"/>
+              </a:rPr>
+              <a:t> </a:t>
+            </a:r>
+            <a:r>
+              <a:rPr lang="de-DE" sz="800" i="1" dirty="0" err="1">
+                <a:solidFill>
+                  <a:srgbClr val="002060"/>
+                </a:solidFill>
+                <a:latin typeface="Georgia" panose="02040502050405020303" pitchFamily="18" charset="0"/>
+              </a:rPr>
+              <a:t>doesn't</a:t>
+            </a:r>
+            <a:r>
+              <a:rPr lang="de-DE" sz="800" i="1" dirty="0">
+                <a:solidFill>
+                  <a:srgbClr val="002060"/>
+                </a:solidFill>
+                <a:latin typeface="Georgia" panose="02040502050405020303" pitchFamily="18" charset="0"/>
+              </a:rPr>
+              <a:t> </a:t>
+            </a:r>
+            <a:r>
+              <a:rPr lang="de-DE" sz="800" i="1" dirty="0" err="1">
+                <a:solidFill>
+                  <a:srgbClr val="002060"/>
+                </a:solidFill>
+                <a:latin typeface="Georgia" panose="02040502050405020303" pitchFamily="18" charset="0"/>
+              </a:rPr>
+              <a:t>provide</a:t>
+            </a:r>
+            <a:r>
+              <a:rPr lang="de-DE" sz="800" i="1" dirty="0">
+                <a:solidFill>
+                  <a:srgbClr val="002060"/>
+                </a:solidFill>
+                <a:latin typeface="Georgia" panose="02040502050405020303" pitchFamily="18" charset="0"/>
+              </a:rPr>
+              <a:t> </a:t>
+            </a:r>
+            <a:r>
+              <a:rPr lang="de-DE" sz="800" i="1" dirty="0" err="1">
+                <a:solidFill>
+                  <a:srgbClr val="002060"/>
+                </a:solidFill>
+                <a:latin typeface="Georgia" panose="02040502050405020303" pitchFamily="18" charset="0"/>
+              </a:rPr>
+              <a:t>information</a:t>
+            </a:r>
+            <a:r>
+              <a:rPr lang="de-DE" sz="800" i="1" dirty="0">
+                <a:solidFill>
+                  <a:srgbClr val="002060"/>
+                </a:solidFill>
+                <a:latin typeface="Georgia" panose="02040502050405020303" pitchFamily="18" charset="0"/>
+              </a:rPr>
+              <a:t> </a:t>
+            </a:r>
+            <a:r>
+              <a:rPr lang="de-DE" sz="800" i="1" dirty="0" err="1">
+                <a:solidFill>
+                  <a:srgbClr val="002060"/>
+                </a:solidFill>
+                <a:latin typeface="Georgia" panose="02040502050405020303" pitchFamily="18" charset="0"/>
+              </a:rPr>
+              <a:t>about</a:t>
+            </a:r>
+            <a:r>
+              <a:rPr lang="de-DE" sz="800" i="1" dirty="0">
+                <a:solidFill>
+                  <a:srgbClr val="002060"/>
+                </a:solidFill>
+                <a:latin typeface="Georgia" panose="02040502050405020303" pitchFamily="18" charset="0"/>
+              </a:rPr>
+              <a:t> </a:t>
+            </a:r>
+            <a:r>
+              <a:rPr lang="de-DE" sz="800" i="1" dirty="0" err="1">
+                <a:solidFill>
+                  <a:srgbClr val="002060"/>
+                </a:solidFill>
+                <a:latin typeface="Georgia" panose="02040502050405020303" pitchFamily="18" charset="0"/>
+              </a:rPr>
+              <a:t>the</a:t>
+            </a:r>
+            <a:r>
+              <a:rPr lang="de-DE" sz="800" i="1" dirty="0">
+                <a:solidFill>
+                  <a:srgbClr val="002060"/>
+                </a:solidFill>
+                <a:latin typeface="Georgia" panose="02040502050405020303" pitchFamily="18" charset="0"/>
+              </a:rPr>
+              <a:t> </a:t>
+            </a:r>
+            <a:r>
+              <a:rPr lang="de-DE" sz="800" i="1" dirty="0" err="1">
+                <a:solidFill>
+                  <a:srgbClr val="002060"/>
+                </a:solidFill>
+                <a:latin typeface="Georgia" panose="02040502050405020303" pitchFamily="18" charset="0"/>
+              </a:rPr>
+              <a:t>given</a:t>
+            </a:r>
+            <a:r>
+              <a:rPr lang="de-DE" sz="800" i="1" dirty="0">
+                <a:solidFill>
+                  <a:srgbClr val="002060"/>
+                </a:solidFill>
+                <a:latin typeface="Georgia" panose="02040502050405020303" pitchFamily="18" charset="0"/>
+              </a:rPr>
+              <a:t> </a:t>
+            </a:r>
+            <a:r>
+              <a:rPr lang="de-DE" sz="800" i="1" dirty="0" err="1">
+                <a:solidFill>
+                  <a:srgbClr val="002060"/>
+                </a:solidFill>
+                <a:latin typeface="Georgia" panose="02040502050405020303" pitchFamily="18" charset="0"/>
+              </a:rPr>
+              <a:t>question</a:t>
+            </a:r>
+            <a:r>
+              <a:rPr lang="de-DE" sz="800" i="1" dirty="0">
+                <a:solidFill>
+                  <a:srgbClr val="002060"/>
+                </a:solidFill>
+                <a:latin typeface="Georgia" panose="02040502050405020303" pitchFamily="18" charset="0"/>
+              </a:rPr>
+              <a:t>.</a:t>
+            </a:r>
+          </a:p>
+          <a:p>
+            <a:r>
+              <a:rPr lang="de-DE" sz="800" i="1" dirty="0">
+                <a:solidFill>
+                  <a:srgbClr val="002060"/>
+                </a:solidFill>
+                <a:latin typeface="Georgia" panose="02040502050405020303" pitchFamily="18" charset="0"/>
+              </a:rPr>
+              <a:t>[…]</a:t>
+            </a:r>
+          </a:p>
+          <a:p>
+            <a:r>
+              <a:rPr lang="de-DE" sz="800" i="1" dirty="0" err="1">
+                <a:solidFill>
+                  <a:srgbClr val="002060"/>
+                </a:solidFill>
+                <a:latin typeface="Georgia" panose="02040502050405020303" pitchFamily="18" charset="0"/>
+              </a:rPr>
+              <a:t>Example</a:t>
+            </a:r>
+            <a:r>
+              <a:rPr lang="de-DE" sz="800" i="1" dirty="0">
+                <a:solidFill>
+                  <a:srgbClr val="002060"/>
+                </a:solidFill>
+                <a:latin typeface="Georgia" panose="02040502050405020303" pitchFamily="18" charset="0"/>
+              </a:rPr>
+              <a:t>:</a:t>
+            </a:r>
+          </a:p>
+          <a:p>
+            <a:r>
+              <a:rPr lang="de-DE" sz="800" i="1" dirty="0">
+                <a:solidFill>
+                  <a:srgbClr val="002060"/>
+                </a:solidFill>
+                <a:latin typeface="Georgia" panose="02040502050405020303" pitchFamily="18" charset="0"/>
+              </a:rPr>
+              <a:t>- </a:t>
+            </a:r>
+            <a:r>
+              <a:rPr lang="de-DE" sz="800" i="1" dirty="0" err="1">
+                <a:solidFill>
+                  <a:srgbClr val="002060"/>
+                </a:solidFill>
+                <a:latin typeface="Georgia" panose="02040502050405020303" pitchFamily="18" charset="0"/>
+              </a:rPr>
+              <a:t>What</a:t>
+            </a:r>
+            <a:r>
+              <a:rPr lang="de-DE" sz="800" i="1" dirty="0">
+                <a:solidFill>
+                  <a:srgbClr val="002060"/>
+                </a:solidFill>
+                <a:latin typeface="Georgia" panose="02040502050405020303" pitchFamily="18" charset="0"/>
+              </a:rPr>
+              <a:t> was </a:t>
+            </a:r>
+            <a:r>
+              <a:rPr lang="de-DE" sz="800" i="1" dirty="0" err="1">
+                <a:solidFill>
+                  <a:srgbClr val="002060"/>
+                </a:solidFill>
+                <a:latin typeface="Georgia" panose="02040502050405020303" pitchFamily="18" charset="0"/>
+              </a:rPr>
+              <a:t>the</a:t>
+            </a:r>
+            <a:r>
+              <a:rPr lang="de-DE" sz="800" i="1" dirty="0">
+                <a:solidFill>
+                  <a:srgbClr val="002060"/>
+                </a:solidFill>
+                <a:latin typeface="Georgia" panose="02040502050405020303" pitchFamily="18" charset="0"/>
+              </a:rPr>
+              <a:t> </a:t>
+            </a:r>
+            <a:r>
+              <a:rPr lang="de-DE" sz="800" i="1" dirty="0" err="1">
+                <a:solidFill>
+                  <a:srgbClr val="002060"/>
+                </a:solidFill>
+                <a:latin typeface="Georgia" panose="02040502050405020303" pitchFamily="18" charset="0"/>
+              </a:rPr>
+              <a:t>sales</a:t>
+            </a:r>
+            <a:r>
+              <a:rPr lang="de-DE" sz="800" i="1" dirty="0">
+                <a:solidFill>
+                  <a:srgbClr val="002060"/>
+                </a:solidFill>
+                <a:latin typeface="Georgia" panose="02040502050405020303" pitchFamily="18" charset="0"/>
+              </a:rPr>
+              <a:t> </a:t>
+            </a:r>
+            <a:r>
+              <a:rPr lang="de-DE" sz="800" i="1" dirty="0" err="1">
+                <a:solidFill>
+                  <a:srgbClr val="002060"/>
+                </a:solidFill>
+                <a:latin typeface="Georgia" panose="02040502050405020303" pitchFamily="18" charset="0"/>
+              </a:rPr>
+              <a:t>revenue</a:t>
+            </a:r>
+            <a:r>
+              <a:rPr lang="de-DE" sz="800" i="1" dirty="0">
+                <a:solidFill>
+                  <a:srgbClr val="002060"/>
+                </a:solidFill>
+                <a:latin typeface="Georgia" panose="02040502050405020303" pitchFamily="18" charset="0"/>
+              </a:rPr>
+              <a:t> </a:t>
+            </a:r>
+            <a:r>
+              <a:rPr lang="de-DE" sz="800" i="1" dirty="0" err="1">
+                <a:solidFill>
+                  <a:srgbClr val="002060"/>
+                </a:solidFill>
+                <a:latin typeface="Georgia" panose="02040502050405020303" pitchFamily="18" charset="0"/>
+              </a:rPr>
+              <a:t>of</a:t>
+            </a:r>
+            <a:r>
+              <a:rPr lang="de-DE" sz="800" i="1" dirty="0">
+                <a:solidFill>
+                  <a:srgbClr val="002060"/>
+                </a:solidFill>
+                <a:latin typeface="Georgia" panose="02040502050405020303" pitchFamily="18" charset="0"/>
+              </a:rPr>
+              <a:t> Company Y </a:t>
+            </a:r>
+            <a:r>
+              <a:rPr lang="de-DE" sz="800" i="1" dirty="0" err="1">
+                <a:solidFill>
+                  <a:srgbClr val="002060"/>
+                </a:solidFill>
+                <a:latin typeface="Georgia" panose="02040502050405020303" pitchFamily="18" charset="0"/>
+              </a:rPr>
+              <a:t>from</a:t>
+            </a:r>
+            <a:r>
+              <a:rPr lang="de-DE" sz="800" i="1" dirty="0">
+                <a:solidFill>
+                  <a:srgbClr val="002060"/>
+                </a:solidFill>
+                <a:latin typeface="Georgia" panose="02040502050405020303" pitchFamily="18" charset="0"/>
+              </a:rPr>
+              <a:t> 2022 </a:t>
+            </a:r>
+            <a:r>
+              <a:rPr lang="de-DE" sz="800" i="1" dirty="0" err="1">
+                <a:solidFill>
+                  <a:srgbClr val="002060"/>
+                </a:solidFill>
+                <a:latin typeface="Georgia" panose="02040502050405020303" pitchFamily="18" charset="0"/>
+              </a:rPr>
+              <a:t>to</a:t>
+            </a:r>
+            <a:r>
+              <a:rPr lang="de-DE" sz="800" i="1" dirty="0">
+                <a:solidFill>
+                  <a:srgbClr val="002060"/>
+                </a:solidFill>
+                <a:latin typeface="Georgia" panose="02040502050405020303" pitchFamily="18" charset="0"/>
+              </a:rPr>
+              <a:t> 2024?</a:t>
+            </a:r>
+          </a:p>
+          <a:p>
+            <a:r>
+              <a:rPr lang="de-DE" sz="800" i="1" dirty="0">
+                <a:solidFill>
+                  <a:srgbClr val="002060"/>
+                </a:solidFill>
+                <a:latin typeface="Georgia" panose="02040502050405020303" pitchFamily="18" charset="0"/>
+              </a:rPr>
+              <a:t>  2,500</a:t>
+            </a:r>
+          </a:p>
+          <a:p>
+            <a:r>
+              <a:rPr lang="de-DE" sz="800" i="1" dirty="0">
+                <a:solidFill>
+                  <a:srgbClr val="002060"/>
+                </a:solidFill>
+                <a:latin typeface="Georgia" panose="02040502050405020303" pitchFamily="18" charset="0"/>
+              </a:rPr>
+              <a:t>[…]</a:t>
+            </a:r>
+          </a:p>
+          <a:p>
+            <a:r>
+              <a:rPr lang="de-DE" sz="800" i="1" dirty="0" err="1">
+                <a:solidFill>
+                  <a:srgbClr val="002060"/>
+                </a:solidFill>
+                <a:latin typeface="Georgia" panose="02040502050405020303" pitchFamily="18" charset="0"/>
+              </a:rPr>
+              <a:t>Context</a:t>
+            </a:r>
+            <a:r>
+              <a:rPr lang="de-DE" sz="800" i="1" dirty="0">
+                <a:solidFill>
+                  <a:srgbClr val="002060"/>
+                </a:solidFill>
+                <a:latin typeface="Georgia" panose="02040502050405020303" pitchFamily="18" charset="0"/>
+              </a:rPr>
+              <a:t>: \</a:t>
+            </a:r>
+            <a:r>
+              <a:rPr lang="de-DE" sz="800" i="1" dirty="0" err="1">
+                <a:solidFill>
+                  <a:srgbClr val="002060"/>
+                </a:solidFill>
+                <a:latin typeface="Georgia" panose="02040502050405020303" pitchFamily="18" charset="0"/>
+              </a:rPr>
+              <a:t>n</a:t>
+            </a:r>
+            <a:r>
+              <a:rPr lang="de-DE" sz="800" i="1" dirty="0">
+                <a:solidFill>
+                  <a:srgbClr val="002060"/>
+                </a:solidFill>
+                <a:latin typeface="Georgia" panose="02040502050405020303" pitchFamily="18" charset="0"/>
+              </a:rPr>
+              <a:t> {</a:t>
+            </a:r>
+            <a:r>
+              <a:rPr lang="de-DE" sz="800" i="1" dirty="0" err="1">
+                <a:solidFill>
+                  <a:srgbClr val="002060"/>
+                </a:solidFill>
+                <a:latin typeface="Georgia" panose="02040502050405020303" pitchFamily="18" charset="0"/>
+              </a:rPr>
+              <a:t>context</a:t>
+            </a:r>
+            <a:r>
+              <a:rPr lang="de-DE" sz="800" i="1" dirty="0">
+                <a:solidFill>
+                  <a:srgbClr val="002060"/>
+                </a:solidFill>
+                <a:latin typeface="Georgia" panose="02040502050405020303" pitchFamily="18" charset="0"/>
+              </a:rPr>
+              <a:t>}</a:t>
+            </a:r>
+          </a:p>
+          <a:p>
+            <a:r>
+              <a:rPr lang="de-DE" sz="800" i="1" dirty="0">
+                <a:solidFill>
+                  <a:srgbClr val="002060"/>
+                </a:solidFill>
+                <a:latin typeface="Georgia" panose="02040502050405020303" pitchFamily="18" charset="0"/>
+              </a:rPr>
+              <a:t>Question: \</a:t>
+            </a:r>
+            <a:r>
+              <a:rPr lang="de-DE" sz="800" i="1" dirty="0" err="1">
+                <a:solidFill>
+                  <a:srgbClr val="002060"/>
+                </a:solidFill>
+                <a:latin typeface="Georgia" panose="02040502050405020303" pitchFamily="18" charset="0"/>
+              </a:rPr>
+              <a:t>n</a:t>
+            </a:r>
+            <a:r>
+              <a:rPr lang="de-DE" sz="800" i="1" dirty="0">
+                <a:solidFill>
+                  <a:srgbClr val="002060"/>
+                </a:solidFill>
+                <a:latin typeface="Georgia" panose="02040502050405020303" pitchFamily="18" charset="0"/>
+              </a:rPr>
+              <a:t> {</a:t>
+            </a:r>
+            <a:r>
+              <a:rPr lang="de-DE" sz="800" i="1" dirty="0" err="1">
+                <a:solidFill>
+                  <a:srgbClr val="002060"/>
+                </a:solidFill>
+                <a:latin typeface="Georgia" panose="02040502050405020303" pitchFamily="18" charset="0"/>
+              </a:rPr>
+              <a:t>question</a:t>
+            </a:r>
+            <a:r>
+              <a:rPr lang="de-DE" sz="800" i="1" dirty="0">
+                <a:solidFill>
+                  <a:srgbClr val="002060"/>
+                </a:solidFill>
+                <a:latin typeface="Georgia" panose="02040502050405020303" pitchFamily="18" charset="0"/>
+              </a:rPr>
+              <a:t>}</a:t>
+            </a:r>
+            <a:endParaRPr lang="de-DE" sz="800" i="1" dirty="0">
               <a:solidFill>
                 <a:schemeClr val="accent6"/>
               </a:solidFill>

</xml_diff>